<commit_message>
Put the licence of the wikipedia logo in the presentation
</commit_message>
<xml_diff>
--- a/assets/FOT_Presentation.pptx
+++ b/assets/FOT_Presentation.pptx
@@ -122,6 +122,11 @@
       </a:defRPr>
     </a:lvl9pPr>
   </p:defaultTextStyle>
+  <p:extLst>
+    <p:ext uri="{EFAFB233-063F-42B5-8137-9DF3F51BA10A}">
+      <p15:sldGuideLst xmlns:p15="http://schemas.microsoft.com/office/powerpoint/2012/main"/>
+    </p:ext>
+  </p:extLst>
 </p:presentation>
 </file>
 
@@ -207,7 +212,7 @@
           <a:p>
             <a:fld id="{4479D2D6-7C8A-4DC1-97AB-D3875C10ED7D}" type="datetimeFigureOut">
               <a:rPr lang="en-US" smtClean="0"/>
-              <a:t>1/23/2020</a:t>
+              <a:t>1/24/2020</a:t>
             </a:fld>
             <a:endParaRPr lang="en-US"/>
           </a:p>
@@ -621,7 +626,7 @@
           <a:p>
             <a:fld id="{FA65C1A5-425E-4F7D-ADA2-D08FE822E314}" type="datetimeFigureOut">
               <a:rPr lang="en-US" smtClean="0"/>
-              <a:t>1/23/2020</a:t>
+              <a:t>1/24/2020</a:t>
             </a:fld>
             <a:endParaRPr lang="en-US"/>
           </a:p>
@@ -819,7 +824,7 @@
           <a:p>
             <a:fld id="{FA65C1A5-425E-4F7D-ADA2-D08FE822E314}" type="datetimeFigureOut">
               <a:rPr lang="en-US" smtClean="0"/>
-              <a:t>1/23/2020</a:t>
+              <a:t>1/24/2020</a:t>
             </a:fld>
             <a:endParaRPr lang="en-US"/>
           </a:p>
@@ -1027,7 +1032,7 @@
           <a:p>
             <a:fld id="{FA65C1A5-425E-4F7D-ADA2-D08FE822E314}" type="datetimeFigureOut">
               <a:rPr lang="en-US" smtClean="0"/>
-              <a:t>1/23/2020</a:t>
+              <a:t>1/24/2020</a:t>
             </a:fld>
             <a:endParaRPr lang="en-US"/>
           </a:p>
@@ -1225,7 +1230,7 @@
           <a:p>
             <a:fld id="{FA65C1A5-425E-4F7D-ADA2-D08FE822E314}" type="datetimeFigureOut">
               <a:rPr lang="en-US" smtClean="0"/>
-              <a:t>1/23/2020</a:t>
+              <a:t>1/24/2020</a:t>
             </a:fld>
             <a:endParaRPr lang="en-US"/>
           </a:p>
@@ -1500,7 +1505,7 @@
           <a:p>
             <a:fld id="{FA65C1A5-425E-4F7D-ADA2-D08FE822E314}" type="datetimeFigureOut">
               <a:rPr lang="en-US" smtClean="0"/>
-              <a:t>1/23/2020</a:t>
+              <a:t>1/24/2020</a:t>
             </a:fld>
             <a:endParaRPr lang="en-US"/>
           </a:p>
@@ -1765,7 +1770,7 @@
           <a:p>
             <a:fld id="{FA65C1A5-425E-4F7D-ADA2-D08FE822E314}" type="datetimeFigureOut">
               <a:rPr lang="en-US" smtClean="0"/>
-              <a:t>1/23/2020</a:t>
+              <a:t>1/24/2020</a:t>
             </a:fld>
             <a:endParaRPr lang="en-US"/>
           </a:p>
@@ -2177,7 +2182,7 @@
           <a:p>
             <a:fld id="{FA65C1A5-425E-4F7D-ADA2-D08FE822E314}" type="datetimeFigureOut">
               <a:rPr lang="en-US" smtClean="0"/>
-              <a:t>1/23/2020</a:t>
+              <a:t>1/24/2020</a:t>
             </a:fld>
             <a:endParaRPr lang="en-US"/>
           </a:p>
@@ -2318,7 +2323,7 @@
           <a:p>
             <a:fld id="{FA65C1A5-425E-4F7D-ADA2-D08FE822E314}" type="datetimeFigureOut">
               <a:rPr lang="en-US" smtClean="0"/>
-              <a:t>1/23/2020</a:t>
+              <a:t>1/24/2020</a:t>
             </a:fld>
             <a:endParaRPr lang="en-US"/>
           </a:p>
@@ -2431,7 +2436,7 @@
           <a:p>
             <a:fld id="{FA65C1A5-425E-4F7D-ADA2-D08FE822E314}" type="datetimeFigureOut">
               <a:rPr lang="en-US" smtClean="0"/>
-              <a:t>1/23/2020</a:t>
+              <a:t>1/24/2020</a:t>
             </a:fld>
             <a:endParaRPr lang="en-US"/>
           </a:p>
@@ -2742,7 +2747,7 @@
           <a:p>
             <a:fld id="{FA65C1A5-425E-4F7D-ADA2-D08FE822E314}" type="datetimeFigureOut">
               <a:rPr lang="en-US" smtClean="0"/>
-              <a:t>1/23/2020</a:t>
+              <a:t>1/24/2020</a:t>
             </a:fld>
             <a:endParaRPr lang="en-US"/>
           </a:p>
@@ -3030,7 +3035,7 @@
           <a:p>
             <a:fld id="{FA65C1A5-425E-4F7D-ADA2-D08FE822E314}" type="datetimeFigureOut">
               <a:rPr lang="en-US" smtClean="0"/>
-              <a:t>1/23/2020</a:t>
+              <a:t>1/24/2020</a:t>
             </a:fld>
             <a:endParaRPr lang="en-US"/>
           </a:p>
@@ -3271,7 +3276,7 @@
           <a:p>
             <a:fld id="{FA65C1A5-425E-4F7D-ADA2-D08FE822E314}" type="datetimeFigureOut">
               <a:rPr lang="en-US" smtClean="0"/>
-              <a:t>1/23/2020</a:t>
+              <a:t>1/24/2020</a:t>
             </a:fld>
             <a:endParaRPr lang="en-US"/>
           </a:p>
@@ -6498,8 +6503,8 @@
         </p:blipFill>
         <p:spPr bwMode="auto">
           <a:xfrm>
-            <a:off x="6211729" y="643467"/>
-            <a:ext cx="4422836" cy="5410199"/>
+            <a:off x="6484330" y="623392"/>
+            <a:ext cx="3877632" cy="4743283"/>
           </a:xfrm>
           <a:prstGeom prst="rect">
             <a:avLst/>
@@ -6516,6 +6521,114 @@
           </a:extLst>
         </p:spPr>
       </p:pic>
+      <p:sp>
+        <p:nvSpPr>
+          <p:cNvPr id="4" name="TextBox 3">
+            <a:extLst>
+              <a:ext uri="{FF2B5EF4-FFF2-40B4-BE49-F238E27FC236}">
+                <a16:creationId xmlns:a16="http://schemas.microsoft.com/office/drawing/2014/main" id="{14AB74BE-A3BE-4B60-B0CA-785484D4174E}"/>
+              </a:ext>
+            </a:extLst>
+          </p:cNvPr>
+          <p:cNvSpPr txBox="1"/>
+          <p:nvPr/>
+        </p:nvSpPr>
+        <p:spPr>
+          <a:xfrm>
+            <a:off x="4992981" y="5772943"/>
+            <a:ext cx="6860329" cy="461665"/>
+          </a:xfrm>
+          <a:prstGeom prst="rect">
+            <a:avLst/>
+          </a:prstGeom>
+          <a:noFill/>
+        </p:spPr>
+        <p:txBody>
+          <a:bodyPr wrap="square" rtlCol="0">
+            <a:spAutoFit/>
+          </a:bodyPr>
+          <a:lstStyle/>
+          <a:p>
+            <a:pPr algn="ctr"/>
+            <a:r>
+              <a:rPr lang="en-US" sz="1200" dirty="0">
+                <a:solidFill>
+                  <a:schemeClr val="bg1"/>
+                </a:solidFill>
+              </a:rPr>
+              <a:t>This image is licensed under the </a:t>
+            </a:r>
+            <a:r>
+              <a:rPr lang="en-US" sz="1200" dirty="0">
+                <a:solidFill>
+                  <a:schemeClr val="bg1"/>
+                </a:solidFill>
+                <a:hlinkClick r:id="rId3"/>
+              </a:rPr>
+              <a:t>Creative Commons</a:t>
+            </a:r>
+            <a:r>
+              <a:rPr lang="en-US" sz="1200" dirty="0">
+                <a:solidFill>
+                  <a:schemeClr val="bg1"/>
+                </a:solidFill>
+              </a:rPr>
+              <a:t> </a:t>
+            </a:r>
+            <a:r>
+              <a:rPr lang="en-US" sz="1200" dirty="0">
+                <a:solidFill>
+                  <a:schemeClr val="bg1"/>
+                </a:solidFill>
+                <a:hlinkClick r:id="rId4"/>
+              </a:rPr>
+              <a:t>Attribution-Share Alike 3.0 </a:t>
+            </a:r>
+            <a:r>
+              <a:rPr lang="en-US" sz="1200" dirty="0" err="1">
+                <a:solidFill>
+                  <a:schemeClr val="bg1"/>
+                </a:solidFill>
+                <a:hlinkClick r:id="rId4"/>
+              </a:rPr>
+              <a:t>Unported</a:t>
+            </a:r>
+            <a:r>
+              <a:rPr lang="en-US" sz="1200" dirty="0">
+                <a:solidFill>
+                  <a:schemeClr val="bg1"/>
+                </a:solidFill>
+              </a:rPr>
+              <a:t> license.	</a:t>
+            </a:r>
+          </a:p>
+          <a:p>
+            <a:pPr algn="ctr"/>
+            <a:r>
+              <a:rPr lang="en-US" sz="1200" dirty="0">
+                <a:solidFill>
+                  <a:schemeClr val="bg1"/>
+                </a:solidFill>
+              </a:rPr>
+              <a:t>Attribution: </a:t>
+            </a:r>
+            <a:r>
+              <a:rPr lang="en-US" sz="1200" dirty="0">
+                <a:solidFill>
+                  <a:schemeClr val="bg1"/>
+                </a:solidFill>
+                <a:hlinkClick r:id="rId5"/>
+              </a:rPr>
+              <a:t>Wikimedia Foundation</a:t>
+            </a:r>
+            <a:endParaRPr lang="en-US" sz="1200" dirty="0">
+              <a:solidFill>
+                <a:schemeClr val="bg1"/>
+              </a:solidFill>
+            </a:endParaRPr>
+          </a:p>
+        </p:txBody>
+      </p:sp>
     </p:spTree>
     <p:extLst>
       <p:ext uri="{BB962C8B-B14F-4D97-AF65-F5344CB8AC3E}">

</xml_diff>